<commit_message>
final changes to 1st workshop.ppt
</commit_message>
<xml_diff>
--- a/1st workshop_22A REVIEW.pptx
+++ b/1st workshop_22A REVIEW.pptx
@@ -122,6 +122,11 @@
       </a:defRPr>
     </a:lvl9pPr>
   </p:defaultTextStyle>
+  <p:extLst>
+    <p:ext uri="{EFAFB233-063F-42B5-8137-9DF3F51BA10A}">
+      <p15:sldGuideLst xmlns:p15="http://schemas.microsoft.com/office/powerpoint/2012/main"/>
+    </p:ext>
+  </p:extLst>
 </p:presentation>
 </file>
 
@@ -141,8 +146,8 @@
 <p:cmLst xmlns:a="http://schemas.openxmlformats.org/drawingml/2006/main" xmlns:r="http://schemas.openxmlformats.org/officeDocument/2006/relationships" xmlns:p="http://schemas.openxmlformats.org/presentationml/2006/main">
   <p:cm authorId="1" dt="2016-01-07T20:20:43.903" idx="17">
     <p:pos x="10" y="10"/>
-    <p:text>What an honor to stand here in front of you guys and be listened to. My name is Anh Pham, I came to D.G club last quarter and joined Simple Game 3 months ago. So 3 months ago, I was at your seat, but I was not interested in game.</p:text>
-    <p:extLst>
+    <p:text>My name is Anh. I was in Simple Game club last quarter. So 3 month, I was sitiing where you are sitting now. But within 3 months, I was able to finish a simple game by myself. You may feel threatened</p:text>
+    <p:extLst mod="1">
       <p:ext uri="{C676402C-5697-4E1C-873F-D02D1690AC5C}">
         <p15:threadingInfo xmlns:p15="http://schemas.microsoft.com/office/powerpoint/2012/main" timeZoneBias="480"/>
       </p:ext>
@@ -518,7 +523,7 @@
           <a:p>
             <a:fld id="{48A87A34-81AB-432B-8DAE-1953F412C126}" type="datetimeFigureOut">
               <a:rPr lang="en-US" dirty="0"/>
-              <a:t>1/7/2016</a:t>
+              <a:t>1/8/2016</a:t>
             </a:fld>
             <a:endParaRPr lang="en-US" dirty="0"/>
           </a:p>
@@ -800,7 +805,7 @@
           <a:p>
             <a:fld id="{48A87A34-81AB-432B-8DAE-1953F412C126}" type="datetimeFigureOut">
               <a:rPr lang="en-US" dirty="0"/>
-              <a:t>1/7/2016</a:t>
+              <a:t>1/8/2016</a:t>
             </a:fld>
             <a:endParaRPr lang="en-US" dirty="0"/>
           </a:p>
@@ -987,7 +992,7 @@
           <a:p>
             <a:fld id="{48A87A34-81AB-432B-8DAE-1953F412C126}" type="datetimeFigureOut">
               <a:rPr lang="en-US" dirty="0"/>
-              <a:t>1/7/2016</a:t>
+              <a:t>1/8/2016</a:t>
             </a:fld>
             <a:endParaRPr lang="en-US" dirty="0"/>
           </a:p>
@@ -1243,7 +1248,7 @@
           <a:p>
             <a:fld id="{48A87A34-81AB-432B-8DAE-1953F412C126}" type="datetimeFigureOut">
               <a:rPr lang="en-US" dirty="0"/>
-              <a:t>1/7/2016</a:t>
+              <a:t>1/8/2016</a:t>
             </a:fld>
             <a:endParaRPr lang="en-US" dirty="0"/>
           </a:p>
@@ -1662,7 +1667,7 @@
           <a:p>
             <a:fld id="{48A87A34-81AB-432B-8DAE-1953F412C126}" type="datetimeFigureOut">
               <a:rPr lang="en-US" dirty="0"/>
-              <a:t>1/7/2016</a:t>
+              <a:t>1/8/2016</a:t>
             </a:fld>
             <a:endParaRPr lang="en-US" dirty="0"/>
           </a:p>
@@ -2203,7 +2208,7 @@
           <a:p>
             <a:fld id="{48A87A34-81AB-432B-8DAE-1953F412C126}" type="datetimeFigureOut">
               <a:rPr lang="en-US" dirty="0"/>
-              <a:t>1/7/2016</a:t>
+              <a:t>1/8/2016</a:t>
             </a:fld>
             <a:endParaRPr lang="en-US" dirty="0"/>
           </a:p>
@@ -3038,7 +3043,7 @@
           <a:p>
             <a:fld id="{48A87A34-81AB-432B-8DAE-1953F412C126}" type="datetimeFigureOut">
               <a:rPr lang="en-US" dirty="0"/>
-              <a:t>1/7/2016</a:t>
+              <a:t>1/8/2016</a:t>
             </a:fld>
             <a:endParaRPr lang="en-US" dirty="0"/>
           </a:p>
@@ -3203,7 +3208,7 @@
           <a:p>
             <a:fld id="{48A87A34-81AB-432B-8DAE-1953F412C126}" type="datetimeFigureOut">
               <a:rPr lang="en-US" dirty="0"/>
-              <a:t>1/7/2016</a:t>
+              <a:t>1/8/2016</a:t>
             </a:fld>
             <a:endParaRPr lang="en-US" dirty="0"/>
           </a:p>
@@ -3382,7 +3387,7 @@
           <a:p>
             <a:fld id="{48A87A34-81AB-432B-8DAE-1953F412C126}" type="datetimeFigureOut">
               <a:rPr lang="en-US" dirty="0"/>
-              <a:t>1/7/2016</a:t>
+              <a:t>1/8/2016</a:t>
             </a:fld>
             <a:endParaRPr lang="en-US" dirty="0"/>
           </a:p>
@@ -3547,7 +3552,7 @@
           <a:p>
             <a:fld id="{48A87A34-81AB-432B-8DAE-1953F412C126}" type="datetimeFigureOut">
               <a:rPr lang="en-US" dirty="0"/>
-              <a:t>1/7/2016</a:t>
+              <a:t>1/8/2016</a:t>
             </a:fld>
             <a:endParaRPr lang="en-US" dirty="0"/>
           </a:p>
@@ -3790,7 +3795,7 @@
           <a:p>
             <a:fld id="{48A87A34-81AB-432B-8DAE-1953F412C126}" type="datetimeFigureOut">
               <a:rPr lang="en-US" dirty="0"/>
-              <a:t>1/7/2016</a:t>
+              <a:t>1/8/2016</a:t>
             </a:fld>
             <a:endParaRPr lang="en-US" dirty="0"/>
           </a:p>
@@ -4022,7 +4027,7 @@
           <a:p>
             <a:fld id="{48A87A34-81AB-432B-8DAE-1953F412C126}" type="datetimeFigureOut">
               <a:rPr lang="en-US" dirty="0"/>
-              <a:t>1/7/2016</a:t>
+              <a:t>1/8/2016</a:t>
             </a:fld>
             <a:endParaRPr lang="en-US" dirty="0"/>
           </a:p>
@@ -4390,7 +4395,7 @@
           <a:p>
             <a:fld id="{48A87A34-81AB-432B-8DAE-1953F412C126}" type="datetimeFigureOut">
               <a:rPr lang="en-US" dirty="0"/>
-              <a:t>1/7/2016</a:t>
+              <a:t>1/8/2016</a:t>
             </a:fld>
             <a:endParaRPr lang="en-US" dirty="0"/>
           </a:p>
@@ -4503,7 +4508,7 @@
           <a:p>
             <a:fld id="{48A87A34-81AB-432B-8DAE-1953F412C126}" type="datetimeFigureOut">
               <a:rPr lang="en-US" dirty="0"/>
-              <a:t>1/7/2016</a:t>
+              <a:t>1/8/2016</a:t>
             </a:fld>
             <a:endParaRPr lang="en-US" dirty="0"/>
           </a:p>
@@ -4593,7 +4598,7 @@
           <a:p>
             <a:fld id="{48A87A34-81AB-432B-8DAE-1953F412C126}" type="datetimeFigureOut">
               <a:rPr lang="en-US" dirty="0"/>
-              <a:t>1/7/2016</a:t>
+              <a:t>1/8/2016</a:t>
             </a:fld>
             <a:endParaRPr lang="en-US" dirty="0"/>
           </a:p>
@@ -4839,7 +4844,7 @@
           <a:p>
             <a:fld id="{48A87A34-81AB-432B-8DAE-1953F412C126}" type="datetimeFigureOut">
               <a:rPr lang="en-US" dirty="0"/>
-              <a:t>1/7/2016</a:t>
+              <a:t>1/8/2016</a:t>
             </a:fld>
             <a:endParaRPr lang="en-US" dirty="0"/>
           </a:p>
@@ -5121,7 +5126,7 @@
           <a:p>
             <a:fld id="{48A87A34-81AB-432B-8DAE-1953F412C126}" type="datetimeFigureOut">
               <a:rPr lang="en-US" dirty="0"/>
-              <a:t>1/7/2016</a:t>
+              <a:t>1/8/2016</a:t>
             </a:fld>
             <a:endParaRPr lang="en-US" dirty="0"/>
           </a:p>
@@ -5330,7 +5335,7 @@
             <a:fld id="{48A87A34-81AB-432B-8DAE-1953F412C126}" type="datetimeFigureOut">
               <a:rPr lang="en-US" dirty="0"/>
               <a:pPr/>
-              <a:t>1/7/2016</a:t>
+              <a:t>1/8/2016</a:t>
             </a:fld>
             <a:endParaRPr lang="en-US" dirty="0"/>
           </a:p>
@@ -5819,7 +5824,7 @@
         </p:nvSpPr>
         <p:spPr>
           <a:xfrm>
-            <a:off x="1512142" y="807522"/>
+            <a:off x="1584713" y="749465"/>
             <a:ext cx="9001462" cy="2416484"/>
           </a:xfrm>
         </p:spPr>
@@ -8272,9 +8277,570 @@
   <p:timing>
     <p:tnLst>
       <p:par>
-        <p:cTn id="1" dur="indefinite" restart="never" nodeType="tmRoot"/>
+        <p:cTn id="1" dur="indefinite" restart="never" nodeType="tmRoot">
+          <p:childTnLst>
+            <p:seq concurrent="1" nextAc="seek">
+              <p:cTn id="2" dur="indefinite" nodeType="mainSeq">
+                <p:childTnLst>
+                  <p:par>
+                    <p:cTn id="3" fill="hold">
+                      <p:stCondLst>
+                        <p:cond delay="indefinite"/>
+                      </p:stCondLst>
+                      <p:childTnLst>
+                        <p:par>
+                          <p:cTn id="4" fill="hold">
+                            <p:stCondLst>
+                              <p:cond delay="0"/>
+                            </p:stCondLst>
+                            <p:childTnLst>
+                              <p:par>
+                                <p:cTn id="5" presetID="2" presetClass="entr" presetSubtype="4" fill="hold" grpId="0" nodeType="clickEffect">
+                                  <p:stCondLst>
+                                    <p:cond delay="0"/>
+                                  </p:stCondLst>
+                                  <p:childTnLst>
+                                    <p:set>
+                                      <p:cBhvr>
+                                        <p:cTn id="6" dur="1" fill="hold">
+                                          <p:stCondLst>
+                                            <p:cond delay="0"/>
+                                          </p:stCondLst>
+                                        </p:cTn>
+                                        <p:tgtEl>
+                                          <p:spTgt spid="3">
+                                            <p:txEl>
+                                              <p:pRg st="0" end="0"/>
+                                            </p:txEl>
+                                          </p:spTgt>
+                                        </p:tgtEl>
+                                        <p:attrNameLst>
+                                          <p:attrName>style.visibility</p:attrName>
+                                        </p:attrNameLst>
+                                      </p:cBhvr>
+                                      <p:to>
+                                        <p:strVal val="visible"/>
+                                      </p:to>
+                                    </p:set>
+                                    <p:anim calcmode="lin" valueType="num">
+                                      <p:cBhvr additive="base">
+                                        <p:cTn id="7" dur="500" fill="hold"/>
+                                        <p:tgtEl>
+                                          <p:spTgt spid="3">
+                                            <p:txEl>
+                                              <p:pRg st="0" end="0"/>
+                                            </p:txEl>
+                                          </p:spTgt>
+                                        </p:tgtEl>
+                                        <p:attrNameLst>
+                                          <p:attrName>ppt_x</p:attrName>
+                                        </p:attrNameLst>
+                                      </p:cBhvr>
+                                      <p:tavLst>
+                                        <p:tav tm="0">
+                                          <p:val>
+                                            <p:strVal val="#ppt_x"/>
+                                          </p:val>
+                                        </p:tav>
+                                        <p:tav tm="100000">
+                                          <p:val>
+                                            <p:strVal val="#ppt_x"/>
+                                          </p:val>
+                                        </p:tav>
+                                      </p:tavLst>
+                                    </p:anim>
+                                    <p:anim calcmode="lin" valueType="num">
+                                      <p:cBhvr additive="base">
+                                        <p:cTn id="8" dur="500" fill="hold"/>
+                                        <p:tgtEl>
+                                          <p:spTgt spid="3">
+                                            <p:txEl>
+                                              <p:pRg st="0" end="0"/>
+                                            </p:txEl>
+                                          </p:spTgt>
+                                        </p:tgtEl>
+                                        <p:attrNameLst>
+                                          <p:attrName>ppt_y</p:attrName>
+                                        </p:attrNameLst>
+                                      </p:cBhvr>
+                                      <p:tavLst>
+                                        <p:tav tm="0">
+                                          <p:val>
+                                            <p:strVal val="1+#ppt_h/2"/>
+                                          </p:val>
+                                        </p:tav>
+                                        <p:tav tm="100000">
+                                          <p:val>
+                                            <p:strVal val="#ppt_y"/>
+                                          </p:val>
+                                        </p:tav>
+                                      </p:tavLst>
+                                    </p:anim>
+                                  </p:childTnLst>
+                                </p:cTn>
+                              </p:par>
+                              <p:par>
+                                <p:cTn id="9" presetID="2" presetClass="entr" presetSubtype="4" fill="hold" grpId="0" nodeType="withEffect">
+                                  <p:stCondLst>
+                                    <p:cond delay="0"/>
+                                  </p:stCondLst>
+                                  <p:childTnLst>
+                                    <p:set>
+                                      <p:cBhvr>
+                                        <p:cTn id="10" dur="1" fill="hold">
+                                          <p:stCondLst>
+                                            <p:cond delay="0"/>
+                                          </p:stCondLst>
+                                        </p:cTn>
+                                        <p:tgtEl>
+                                          <p:spTgt spid="3">
+                                            <p:txEl>
+                                              <p:pRg st="1" end="1"/>
+                                            </p:txEl>
+                                          </p:spTgt>
+                                        </p:tgtEl>
+                                        <p:attrNameLst>
+                                          <p:attrName>style.visibility</p:attrName>
+                                        </p:attrNameLst>
+                                      </p:cBhvr>
+                                      <p:to>
+                                        <p:strVal val="visible"/>
+                                      </p:to>
+                                    </p:set>
+                                    <p:anim calcmode="lin" valueType="num">
+                                      <p:cBhvr additive="base">
+                                        <p:cTn id="11" dur="500" fill="hold"/>
+                                        <p:tgtEl>
+                                          <p:spTgt spid="3">
+                                            <p:txEl>
+                                              <p:pRg st="1" end="1"/>
+                                            </p:txEl>
+                                          </p:spTgt>
+                                        </p:tgtEl>
+                                        <p:attrNameLst>
+                                          <p:attrName>ppt_x</p:attrName>
+                                        </p:attrNameLst>
+                                      </p:cBhvr>
+                                      <p:tavLst>
+                                        <p:tav tm="0">
+                                          <p:val>
+                                            <p:strVal val="#ppt_x"/>
+                                          </p:val>
+                                        </p:tav>
+                                        <p:tav tm="100000">
+                                          <p:val>
+                                            <p:strVal val="#ppt_x"/>
+                                          </p:val>
+                                        </p:tav>
+                                      </p:tavLst>
+                                    </p:anim>
+                                    <p:anim calcmode="lin" valueType="num">
+                                      <p:cBhvr additive="base">
+                                        <p:cTn id="12" dur="500" fill="hold"/>
+                                        <p:tgtEl>
+                                          <p:spTgt spid="3">
+                                            <p:txEl>
+                                              <p:pRg st="1" end="1"/>
+                                            </p:txEl>
+                                          </p:spTgt>
+                                        </p:tgtEl>
+                                        <p:attrNameLst>
+                                          <p:attrName>ppt_y</p:attrName>
+                                        </p:attrNameLst>
+                                      </p:cBhvr>
+                                      <p:tavLst>
+                                        <p:tav tm="0">
+                                          <p:val>
+                                            <p:strVal val="1+#ppt_h/2"/>
+                                          </p:val>
+                                        </p:tav>
+                                        <p:tav tm="100000">
+                                          <p:val>
+                                            <p:strVal val="#ppt_y"/>
+                                          </p:val>
+                                        </p:tav>
+                                      </p:tavLst>
+                                    </p:anim>
+                                  </p:childTnLst>
+                                </p:cTn>
+                              </p:par>
+                              <p:par>
+                                <p:cTn id="13" presetID="2" presetClass="entr" presetSubtype="4" fill="hold" grpId="0" nodeType="withEffect">
+                                  <p:stCondLst>
+                                    <p:cond delay="0"/>
+                                  </p:stCondLst>
+                                  <p:childTnLst>
+                                    <p:set>
+                                      <p:cBhvr>
+                                        <p:cTn id="14" dur="1" fill="hold">
+                                          <p:stCondLst>
+                                            <p:cond delay="0"/>
+                                          </p:stCondLst>
+                                        </p:cTn>
+                                        <p:tgtEl>
+                                          <p:spTgt spid="3">
+                                            <p:txEl>
+                                              <p:pRg st="2" end="2"/>
+                                            </p:txEl>
+                                          </p:spTgt>
+                                        </p:tgtEl>
+                                        <p:attrNameLst>
+                                          <p:attrName>style.visibility</p:attrName>
+                                        </p:attrNameLst>
+                                      </p:cBhvr>
+                                      <p:to>
+                                        <p:strVal val="visible"/>
+                                      </p:to>
+                                    </p:set>
+                                    <p:anim calcmode="lin" valueType="num">
+                                      <p:cBhvr additive="base">
+                                        <p:cTn id="15" dur="500" fill="hold"/>
+                                        <p:tgtEl>
+                                          <p:spTgt spid="3">
+                                            <p:txEl>
+                                              <p:pRg st="2" end="2"/>
+                                            </p:txEl>
+                                          </p:spTgt>
+                                        </p:tgtEl>
+                                        <p:attrNameLst>
+                                          <p:attrName>ppt_x</p:attrName>
+                                        </p:attrNameLst>
+                                      </p:cBhvr>
+                                      <p:tavLst>
+                                        <p:tav tm="0">
+                                          <p:val>
+                                            <p:strVal val="#ppt_x"/>
+                                          </p:val>
+                                        </p:tav>
+                                        <p:tav tm="100000">
+                                          <p:val>
+                                            <p:strVal val="#ppt_x"/>
+                                          </p:val>
+                                        </p:tav>
+                                      </p:tavLst>
+                                    </p:anim>
+                                    <p:anim calcmode="lin" valueType="num">
+                                      <p:cBhvr additive="base">
+                                        <p:cTn id="16" dur="500" fill="hold"/>
+                                        <p:tgtEl>
+                                          <p:spTgt spid="3">
+                                            <p:txEl>
+                                              <p:pRg st="2" end="2"/>
+                                            </p:txEl>
+                                          </p:spTgt>
+                                        </p:tgtEl>
+                                        <p:attrNameLst>
+                                          <p:attrName>ppt_y</p:attrName>
+                                        </p:attrNameLst>
+                                      </p:cBhvr>
+                                      <p:tavLst>
+                                        <p:tav tm="0">
+                                          <p:val>
+                                            <p:strVal val="1+#ppt_h/2"/>
+                                          </p:val>
+                                        </p:tav>
+                                        <p:tav tm="100000">
+                                          <p:val>
+                                            <p:strVal val="#ppt_y"/>
+                                          </p:val>
+                                        </p:tav>
+                                      </p:tavLst>
+                                    </p:anim>
+                                  </p:childTnLst>
+                                </p:cTn>
+                              </p:par>
+                              <p:par>
+                                <p:cTn id="17" presetID="2" presetClass="entr" presetSubtype="4" fill="hold" grpId="0" nodeType="withEffect">
+                                  <p:stCondLst>
+                                    <p:cond delay="0"/>
+                                  </p:stCondLst>
+                                  <p:childTnLst>
+                                    <p:set>
+                                      <p:cBhvr>
+                                        <p:cTn id="18" dur="1" fill="hold">
+                                          <p:stCondLst>
+                                            <p:cond delay="0"/>
+                                          </p:stCondLst>
+                                        </p:cTn>
+                                        <p:tgtEl>
+                                          <p:spTgt spid="3">
+                                            <p:txEl>
+                                              <p:pRg st="3" end="3"/>
+                                            </p:txEl>
+                                          </p:spTgt>
+                                        </p:tgtEl>
+                                        <p:attrNameLst>
+                                          <p:attrName>style.visibility</p:attrName>
+                                        </p:attrNameLst>
+                                      </p:cBhvr>
+                                      <p:to>
+                                        <p:strVal val="visible"/>
+                                      </p:to>
+                                    </p:set>
+                                    <p:anim calcmode="lin" valueType="num">
+                                      <p:cBhvr additive="base">
+                                        <p:cTn id="19" dur="500" fill="hold"/>
+                                        <p:tgtEl>
+                                          <p:spTgt spid="3">
+                                            <p:txEl>
+                                              <p:pRg st="3" end="3"/>
+                                            </p:txEl>
+                                          </p:spTgt>
+                                        </p:tgtEl>
+                                        <p:attrNameLst>
+                                          <p:attrName>ppt_x</p:attrName>
+                                        </p:attrNameLst>
+                                      </p:cBhvr>
+                                      <p:tavLst>
+                                        <p:tav tm="0">
+                                          <p:val>
+                                            <p:strVal val="#ppt_x"/>
+                                          </p:val>
+                                        </p:tav>
+                                        <p:tav tm="100000">
+                                          <p:val>
+                                            <p:strVal val="#ppt_x"/>
+                                          </p:val>
+                                        </p:tav>
+                                      </p:tavLst>
+                                    </p:anim>
+                                    <p:anim calcmode="lin" valueType="num">
+                                      <p:cBhvr additive="base">
+                                        <p:cTn id="20" dur="500" fill="hold"/>
+                                        <p:tgtEl>
+                                          <p:spTgt spid="3">
+                                            <p:txEl>
+                                              <p:pRg st="3" end="3"/>
+                                            </p:txEl>
+                                          </p:spTgt>
+                                        </p:tgtEl>
+                                        <p:attrNameLst>
+                                          <p:attrName>ppt_y</p:attrName>
+                                        </p:attrNameLst>
+                                      </p:cBhvr>
+                                      <p:tavLst>
+                                        <p:tav tm="0">
+                                          <p:val>
+                                            <p:strVal val="1+#ppt_h/2"/>
+                                          </p:val>
+                                        </p:tav>
+                                        <p:tav tm="100000">
+                                          <p:val>
+                                            <p:strVal val="#ppt_y"/>
+                                          </p:val>
+                                        </p:tav>
+                                      </p:tavLst>
+                                    </p:anim>
+                                  </p:childTnLst>
+                                </p:cTn>
+                              </p:par>
+                              <p:par>
+                                <p:cTn id="21" presetID="2" presetClass="entr" presetSubtype="4" fill="hold" grpId="0" nodeType="withEffect">
+                                  <p:stCondLst>
+                                    <p:cond delay="0"/>
+                                  </p:stCondLst>
+                                  <p:childTnLst>
+                                    <p:set>
+                                      <p:cBhvr>
+                                        <p:cTn id="22" dur="1" fill="hold">
+                                          <p:stCondLst>
+                                            <p:cond delay="0"/>
+                                          </p:stCondLst>
+                                        </p:cTn>
+                                        <p:tgtEl>
+                                          <p:spTgt spid="3">
+                                            <p:txEl>
+                                              <p:pRg st="4" end="4"/>
+                                            </p:txEl>
+                                          </p:spTgt>
+                                        </p:tgtEl>
+                                        <p:attrNameLst>
+                                          <p:attrName>style.visibility</p:attrName>
+                                        </p:attrNameLst>
+                                      </p:cBhvr>
+                                      <p:to>
+                                        <p:strVal val="visible"/>
+                                      </p:to>
+                                    </p:set>
+                                    <p:anim calcmode="lin" valueType="num">
+                                      <p:cBhvr additive="base">
+                                        <p:cTn id="23" dur="500" fill="hold"/>
+                                        <p:tgtEl>
+                                          <p:spTgt spid="3">
+                                            <p:txEl>
+                                              <p:pRg st="4" end="4"/>
+                                            </p:txEl>
+                                          </p:spTgt>
+                                        </p:tgtEl>
+                                        <p:attrNameLst>
+                                          <p:attrName>ppt_x</p:attrName>
+                                        </p:attrNameLst>
+                                      </p:cBhvr>
+                                      <p:tavLst>
+                                        <p:tav tm="0">
+                                          <p:val>
+                                            <p:strVal val="#ppt_x"/>
+                                          </p:val>
+                                        </p:tav>
+                                        <p:tav tm="100000">
+                                          <p:val>
+                                            <p:strVal val="#ppt_x"/>
+                                          </p:val>
+                                        </p:tav>
+                                      </p:tavLst>
+                                    </p:anim>
+                                    <p:anim calcmode="lin" valueType="num">
+                                      <p:cBhvr additive="base">
+                                        <p:cTn id="24" dur="500" fill="hold"/>
+                                        <p:tgtEl>
+                                          <p:spTgt spid="3">
+                                            <p:txEl>
+                                              <p:pRg st="4" end="4"/>
+                                            </p:txEl>
+                                          </p:spTgt>
+                                        </p:tgtEl>
+                                        <p:attrNameLst>
+                                          <p:attrName>ppt_y</p:attrName>
+                                        </p:attrNameLst>
+                                      </p:cBhvr>
+                                      <p:tavLst>
+                                        <p:tav tm="0">
+                                          <p:val>
+                                            <p:strVal val="1+#ppt_h/2"/>
+                                          </p:val>
+                                        </p:tav>
+                                        <p:tav tm="100000">
+                                          <p:val>
+                                            <p:strVal val="#ppt_y"/>
+                                          </p:val>
+                                        </p:tav>
+                                      </p:tavLst>
+                                    </p:anim>
+                                  </p:childTnLst>
+                                </p:cTn>
+                              </p:par>
+                            </p:childTnLst>
+                          </p:cTn>
+                        </p:par>
+                      </p:childTnLst>
+                    </p:cTn>
+                  </p:par>
+                  <p:par>
+                    <p:cTn id="25" fill="hold">
+                      <p:stCondLst>
+                        <p:cond delay="indefinite"/>
+                      </p:stCondLst>
+                      <p:childTnLst>
+                        <p:par>
+                          <p:cTn id="26" fill="hold">
+                            <p:stCondLst>
+                              <p:cond delay="0"/>
+                            </p:stCondLst>
+                            <p:childTnLst>
+                              <p:par>
+                                <p:cTn id="27" presetID="2" presetClass="entr" presetSubtype="4" fill="hold" grpId="0" nodeType="clickEffect">
+                                  <p:stCondLst>
+                                    <p:cond delay="0"/>
+                                  </p:stCondLst>
+                                  <p:childTnLst>
+                                    <p:set>
+                                      <p:cBhvr>
+                                        <p:cTn id="28" dur="1" fill="hold">
+                                          <p:stCondLst>
+                                            <p:cond delay="0"/>
+                                          </p:stCondLst>
+                                        </p:cTn>
+                                        <p:tgtEl>
+                                          <p:spTgt spid="4"/>
+                                        </p:tgtEl>
+                                        <p:attrNameLst>
+                                          <p:attrName>style.visibility</p:attrName>
+                                        </p:attrNameLst>
+                                      </p:cBhvr>
+                                      <p:to>
+                                        <p:strVal val="visible"/>
+                                      </p:to>
+                                    </p:set>
+                                    <p:anim calcmode="lin" valueType="num">
+                                      <p:cBhvr additive="base">
+                                        <p:cTn id="29" dur="500" fill="hold"/>
+                                        <p:tgtEl>
+                                          <p:spTgt spid="4"/>
+                                        </p:tgtEl>
+                                        <p:attrNameLst>
+                                          <p:attrName>ppt_x</p:attrName>
+                                        </p:attrNameLst>
+                                      </p:cBhvr>
+                                      <p:tavLst>
+                                        <p:tav tm="0">
+                                          <p:val>
+                                            <p:strVal val="#ppt_x"/>
+                                          </p:val>
+                                        </p:tav>
+                                        <p:tav tm="100000">
+                                          <p:val>
+                                            <p:strVal val="#ppt_x"/>
+                                          </p:val>
+                                        </p:tav>
+                                      </p:tavLst>
+                                    </p:anim>
+                                    <p:anim calcmode="lin" valueType="num">
+                                      <p:cBhvr additive="base">
+                                        <p:cTn id="30" dur="500" fill="hold"/>
+                                        <p:tgtEl>
+                                          <p:spTgt spid="4"/>
+                                        </p:tgtEl>
+                                        <p:attrNameLst>
+                                          <p:attrName>ppt_y</p:attrName>
+                                        </p:attrNameLst>
+                                      </p:cBhvr>
+                                      <p:tavLst>
+                                        <p:tav tm="0">
+                                          <p:val>
+                                            <p:strVal val="1+#ppt_h/2"/>
+                                          </p:val>
+                                        </p:tav>
+                                        <p:tav tm="100000">
+                                          <p:val>
+                                            <p:strVal val="#ppt_y"/>
+                                          </p:val>
+                                        </p:tav>
+                                      </p:tavLst>
+                                    </p:anim>
+                                  </p:childTnLst>
+                                </p:cTn>
+                              </p:par>
+                            </p:childTnLst>
+                          </p:cTn>
+                        </p:par>
+                      </p:childTnLst>
+                    </p:cTn>
+                  </p:par>
+                </p:childTnLst>
+              </p:cTn>
+              <p:prevCondLst>
+                <p:cond evt="onPrev" delay="0">
+                  <p:tgtEl>
+                    <p:sldTgt/>
+                  </p:tgtEl>
+                </p:cond>
+              </p:prevCondLst>
+              <p:nextCondLst>
+                <p:cond evt="onNext" delay="0">
+                  <p:tgtEl>
+                    <p:sldTgt/>
+                  </p:tgtEl>
+                </p:cond>
+              </p:nextCondLst>
+            </p:seq>
+          </p:childTnLst>
+        </p:cTn>
       </p:par>
     </p:tnLst>
+    <p:bldLst>
+      <p:bldP spid="3" grpId="0" build="p"/>
+      <p:bldP spid="4" grpId="0"/>
+    </p:bldLst>
   </p:timing>
 </p:sld>
 </file>
@@ -8344,6 +8910,9 @@
           </a:bodyPr>
           <a:lstStyle/>
           <a:p>
+            <a:pPr marL="0" indent="0">
+              <a:buNone/>
+            </a:pPr>
             <a:r>
               <a:rPr lang="en-US" sz="3000" dirty="0" err="1" smtClean="0">
                 <a:solidFill>
@@ -8385,6 +8954,9 @@
             </a:r>
           </a:p>
           <a:p>
+            <a:pPr marL="0" indent="0">
+              <a:buNone/>
+            </a:pPr>
             <a:r>
               <a:rPr lang="en-US" sz="3000" dirty="0" smtClean="0">
                 <a:solidFill>
@@ -8398,6 +8970,9 @@
             </a:r>
           </a:p>
           <a:p>
+            <a:pPr marL="0" indent="0">
+              <a:buNone/>
+            </a:pPr>
             <a:r>
               <a:rPr lang="en-US" sz="3000" dirty="0" smtClean="0">
                 <a:solidFill>
@@ -8411,6 +8986,9 @@
             </a:r>
           </a:p>
           <a:p>
+            <a:pPr marL="0" indent="0">
+              <a:buNone/>
+            </a:pPr>
             <a:r>
               <a:rPr lang="en-US" sz="3000" dirty="0" smtClean="0">
                 <a:solidFill>
@@ -8424,6 +9002,9 @@
             </a:r>
           </a:p>
           <a:p>
+            <a:pPr marL="0" indent="0">
+              <a:buNone/>
+            </a:pPr>
             <a:r>
               <a:rPr lang="en-US" sz="3000" dirty="0" smtClean="0">
                 <a:solidFill>
@@ -8459,9 +9040,340 @@
   <p:timing>
     <p:tnLst>
       <p:par>
-        <p:cTn id="1" dur="indefinite" restart="never" nodeType="tmRoot"/>
+        <p:cTn id="1" dur="indefinite" restart="never" nodeType="tmRoot">
+          <p:childTnLst>
+            <p:seq concurrent="1" nextAc="seek">
+              <p:cTn id="2" dur="indefinite" nodeType="mainSeq">
+                <p:childTnLst>
+                  <p:par>
+                    <p:cTn id="3" fill="hold">
+                      <p:stCondLst>
+                        <p:cond delay="indefinite"/>
+                      </p:stCondLst>
+                      <p:childTnLst>
+                        <p:par>
+                          <p:cTn id="4" fill="hold">
+                            <p:stCondLst>
+                              <p:cond delay="0"/>
+                            </p:stCondLst>
+                            <p:childTnLst>
+                              <p:par>
+                                <p:cTn id="5" presetID="10" presetClass="entr" presetSubtype="0" fill="hold" grpId="0" nodeType="clickEffect">
+                                  <p:stCondLst>
+                                    <p:cond delay="0"/>
+                                  </p:stCondLst>
+                                  <p:childTnLst>
+                                    <p:set>
+                                      <p:cBhvr>
+                                        <p:cTn id="6" dur="1" fill="hold">
+                                          <p:stCondLst>
+                                            <p:cond delay="0"/>
+                                          </p:stCondLst>
+                                        </p:cTn>
+                                        <p:tgtEl>
+                                          <p:spTgt spid="3">
+                                            <p:txEl>
+                                              <p:pRg st="0" end="0"/>
+                                            </p:txEl>
+                                          </p:spTgt>
+                                        </p:tgtEl>
+                                        <p:attrNameLst>
+                                          <p:attrName>style.visibility</p:attrName>
+                                        </p:attrNameLst>
+                                      </p:cBhvr>
+                                      <p:to>
+                                        <p:strVal val="visible"/>
+                                      </p:to>
+                                    </p:set>
+                                    <p:animEffect transition="in" filter="fade">
+                                      <p:cBhvr>
+                                        <p:cTn id="7" dur="500"/>
+                                        <p:tgtEl>
+                                          <p:spTgt spid="3">
+                                            <p:txEl>
+                                              <p:pRg st="0" end="0"/>
+                                            </p:txEl>
+                                          </p:spTgt>
+                                        </p:tgtEl>
+                                      </p:cBhvr>
+                                    </p:animEffect>
+                                  </p:childTnLst>
+                                </p:cTn>
+                              </p:par>
+                            </p:childTnLst>
+                          </p:cTn>
+                        </p:par>
+                      </p:childTnLst>
+                    </p:cTn>
+                  </p:par>
+                  <p:par>
+                    <p:cTn id="8" fill="hold">
+                      <p:stCondLst>
+                        <p:cond delay="indefinite"/>
+                      </p:stCondLst>
+                      <p:childTnLst>
+                        <p:par>
+                          <p:cTn id="9" fill="hold">
+                            <p:stCondLst>
+                              <p:cond delay="0"/>
+                            </p:stCondLst>
+                            <p:childTnLst>
+                              <p:par>
+                                <p:cTn id="10" presetID="10" presetClass="entr" presetSubtype="0" fill="hold" grpId="0" nodeType="clickEffect">
+                                  <p:stCondLst>
+                                    <p:cond delay="0"/>
+                                  </p:stCondLst>
+                                  <p:childTnLst>
+                                    <p:set>
+                                      <p:cBhvr>
+                                        <p:cTn id="11" dur="1" fill="hold">
+                                          <p:stCondLst>
+                                            <p:cond delay="0"/>
+                                          </p:stCondLst>
+                                        </p:cTn>
+                                        <p:tgtEl>
+                                          <p:spTgt spid="3">
+                                            <p:txEl>
+                                              <p:pRg st="1" end="1"/>
+                                            </p:txEl>
+                                          </p:spTgt>
+                                        </p:tgtEl>
+                                        <p:attrNameLst>
+                                          <p:attrName>style.visibility</p:attrName>
+                                        </p:attrNameLst>
+                                      </p:cBhvr>
+                                      <p:to>
+                                        <p:strVal val="visible"/>
+                                      </p:to>
+                                    </p:set>
+                                    <p:animEffect transition="in" filter="fade">
+                                      <p:cBhvr>
+                                        <p:cTn id="12" dur="500"/>
+                                        <p:tgtEl>
+                                          <p:spTgt spid="3">
+                                            <p:txEl>
+                                              <p:pRg st="1" end="1"/>
+                                            </p:txEl>
+                                          </p:spTgt>
+                                        </p:tgtEl>
+                                      </p:cBhvr>
+                                    </p:animEffect>
+                                  </p:childTnLst>
+                                </p:cTn>
+                              </p:par>
+                            </p:childTnLst>
+                          </p:cTn>
+                        </p:par>
+                      </p:childTnLst>
+                    </p:cTn>
+                  </p:par>
+                  <p:par>
+                    <p:cTn id="13" fill="hold">
+                      <p:stCondLst>
+                        <p:cond delay="indefinite"/>
+                      </p:stCondLst>
+                      <p:childTnLst>
+                        <p:par>
+                          <p:cTn id="14" fill="hold">
+                            <p:stCondLst>
+                              <p:cond delay="0"/>
+                            </p:stCondLst>
+                            <p:childTnLst>
+                              <p:par>
+                                <p:cTn id="15" presetID="10" presetClass="entr" presetSubtype="0" fill="hold" grpId="0" nodeType="clickEffect">
+                                  <p:stCondLst>
+                                    <p:cond delay="0"/>
+                                  </p:stCondLst>
+                                  <p:childTnLst>
+                                    <p:set>
+                                      <p:cBhvr>
+                                        <p:cTn id="16" dur="1" fill="hold">
+                                          <p:stCondLst>
+                                            <p:cond delay="0"/>
+                                          </p:stCondLst>
+                                        </p:cTn>
+                                        <p:tgtEl>
+                                          <p:spTgt spid="3">
+                                            <p:txEl>
+                                              <p:pRg st="2" end="2"/>
+                                            </p:txEl>
+                                          </p:spTgt>
+                                        </p:tgtEl>
+                                        <p:attrNameLst>
+                                          <p:attrName>style.visibility</p:attrName>
+                                        </p:attrNameLst>
+                                      </p:cBhvr>
+                                      <p:to>
+                                        <p:strVal val="visible"/>
+                                      </p:to>
+                                    </p:set>
+                                    <p:animEffect transition="in" filter="fade">
+                                      <p:cBhvr>
+                                        <p:cTn id="17" dur="500"/>
+                                        <p:tgtEl>
+                                          <p:spTgt spid="3">
+                                            <p:txEl>
+                                              <p:pRg st="2" end="2"/>
+                                            </p:txEl>
+                                          </p:spTgt>
+                                        </p:tgtEl>
+                                      </p:cBhvr>
+                                    </p:animEffect>
+                                  </p:childTnLst>
+                                </p:cTn>
+                              </p:par>
+                            </p:childTnLst>
+                          </p:cTn>
+                        </p:par>
+                      </p:childTnLst>
+                    </p:cTn>
+                  </p:par>
+                  <p:par>
+                    <p:cTn id="18" fill="hold">
+                      <p:stCondLst>
+                        <p:cond delay="indefinite"/>
+                      </p:stCondLst>
+                      <p:childTnLst>
+                        <p:par>
+                          <p:cTn id="19" fill="hold">
+                            <p:stCondLst>
+                              <p:cond delay="0"/>
+                            </p:stCondLst>
+                            <p:childTnLst>
+                              <p:par>
+                                <p:cTn id="20" presetID="10" presetClass="entr" presetSubtype="0" fill="hold" grpId="0" nodeType="clickEffect">
+                                  <p:stCondLst>
+                                    <p:cond delay="0"/>
+                                  </p:stCondLst>
+                                  <p:childTnLst>
+                                    <p:set>
+                                      <p:cBhvr>
+                                        <p:cTn id="21" dur="1" fill="hold">
+                                          <p:stCondLst>
+                                            <p:cond delay="0"/>
+                                          </p:stCondLst>
+                                        </p:cTn>
+                                        <p:tgtEl>
+                                          <p:spTgt spid="3">
+                                            <p:txEl>
+                                              <p:pRg st="3" end="3"/>
+                                            </p:txEl>
+                                          </p:spTgt>
+                                        </p:tgtEl>
+                                        <p:attrNameLst>
+                                          <p:attrName>style.visibility</p:attrName>
+                                        </p:attrNameLst>
+                                      </p:cBhvr>
+                                      <p:to>
+                                        <p:strVal val="visible"/>
+                                      </p:to>
+                                    </p:set>
+                                    <p:animEffect transition="in" filter="fade">
+                                      <p:cBhvr>
+                                        <p:cTn id="22" dur="500"/>
+                                        <p:tgtEl>
+                                          <p:spTgt spid="3">
+                                            <p:txEl>
+                                              <p:pRg st="3" end="3"/>
+                                            </p:txEl>
+                                          </p:spTgt>
+                                        </p:tgtEl>
+                                      </p:cBhvr>
+                                    </p:animEffect>
+                                  </p:childTnLst>
+                                </p:cTn>
+                              </p:par>
+                            </p:childTnLst>
+                          </p:cTn>
+                        </p:par>
+                      </p:childTnLst>
+                    </p:cTn>
+                  </p:par>
+                  <p:par>
+                    <p:cTn id="23" fill="hold">
+                      <p:stCondLst>
+                        <p:cond delay="indefinite"/>
+                      </p:stCondLst>
+                      <p:childTnLst>
+                        <p:par>
+                          <p:cTn id="24" fill="hold">
+                            <p:stCondLst>
+                              <p:cond delay="0"/>
+                            </p:stCondLst>
+                            <p:childTnLst>
+                              <p:par>
+                                <p:cTn id="25" presetID="10" presetClass="entr" presetSubtype="0" fill="hold" grpId="0" nodeType="clickEffect">
+                                  <p:stCondLst>
+                                    <p:cond delay="0"/>
+                                  </p:stCondLst>
+                                  <p:childTnLst>
+                                    <p:set>
+                                      <p:cBhvr>
+                                        <p:cTn id="26" dur="1" fill="hold">
+                                          <p:stCondLst>
+                                            <p:cond delay="0"/>
+                                          </p:stCondLst>
+                                        </p:cTn>
+                                        <p:tgtEl>
+                                          <p:spTgt spid="3">
+                                            <p:txEl>
+                                              <p:pRg st="4" end="4"/>
+                                            </p:txEl>
+                                          </p:spTgt>
+                                        </p:tgtEl>
+                                        <p:attrNameLst>
+                                          <p:attrName>style.visibility</p:attrName>
+                                        </p:attrNameLst>
+                                      </p:cBhvr>
+                                      <p:to>
+                                        <p:strVal val="visible"/>
+                                      </p:to>
+                                    </p:set>
+                                    <p:animEffect transition="in" filter="fade">
+                                      <p:cBhvr>
+                                        <p:cTn id="27" dur="500"/>
+                                        <p:tgtEl>
+                                          <p:spTgt spid="3">
+                                            <p:txEl>
+                                              <p:pRg st="4" end="4"/>
+                                            </p:txEl>
+                                          </p:spTgt>
+                                        </p:tgtEl>
+                                      </p:cBhvr>
+                                    </p:animEffect>
+                                  </p:childTnLst>
+                                </p:cTn>
+                              </p:par>
+                            </p:childTnLst>
+                          </p:cTn>
+                        </p:par>
+                      </p:childTnLst>
+                    </p:cTn>
+                  </p:par>
+                </p:childTnLst>
+              </p:cTn>
+              <p:prevCondLst>
+                <p:cond evt="onPrev" delay="0">
+                  <p:tgtEl>
+                    <p:sldTgt/>
+                  </p:tgtEl>
+                </p:cond>
+              </p:prevCondLst>
+              <p:nextCondLst>
+                <p:cond evt="onNext" delay="0">
+                  <p:tgtEl>
+                    <p:sldTgt/>
+                  </p:tgtEl>
+                </p:cond>
+              </p:nextCondLst>
+            </p:seq>
+          </p:childTnLst>
+        </p:cTn>
       </p:par>
     </p:tnLst>
+    <p:bldLst>
+      <p:bldP spid="3" grpId="0" build="p"/>
+    </p:bldLst>
   </p:timing>
 </p:sld>
 </file>
@@ -10231,6 +11143,10 @@
               <a:rPr lang="en-US" sz="3000" dirty="0" smtClean="0"/>
               <a:t>Vital concepts learnt in Beginning C++ </a:t>
             </a:r>
+            <a:endParaRPr lang="en-US" sz="3000" dirty="0" smtClean="0"/>
+          </a:p>
+          <a:p>
+            <a:endParaRPr lang="en-US" sz="3000" dirty="0" smtClean="0"/>
           </a:p>
           <a:p>
             <a:r>
@@ -10320,7 +11236,7 @@
           <a:p>
             <a:r>
               <a:rPr lang="en-US" i="1" u="sng" dirty="0" smtClean="0"/>
-              <a:t>What to expect</a:t>
+              <a:t>concepts</a:t>
             </a:r>
             <a:endParaRPr lang="en-US" i="1" u="sng" dirty="0"/>
           </a:p>
@@ -10438,9 +11354,462 @@
   <p:timing>
     <p:tnLst>
       <p:par>
-        <p:cTn id="1" dur="indefinite" restart="never" nodeType="tmRoot"/>
+        <p:cTn id="1" dur="indefinite" restart="never" nodeType="tmRoot">
+          <p:childTnLst>
+            <p:seq concurrent="1" nextAc="seek">
+              <p:cTn id="2" dur="indefinite" nodeType="mainSeq">
+                <p:childTnLst>
+                  <p:par>
+                    <p:cTn id="3" fill="hold">
+                      <p:stCondLst>
+                        <p:cond delay="indefinite"/>
+                      </p:stCondLst>
+                      <p:childTnLst>
+                        <p:par>
+                          <p:cTn id="4" fill="hold">
+                            <p:stCondLst>
+                              <p:cond delay="0"/>
+                            </p:stCondLst>
+                            <p:childTnLst>
+                              <p:par>
+                                <p:cTn id="5" presetID="14" presetClass="entr" presetSubtype="10" fill="hold" grpId="0" nodeType="clickEffect">
+                                  <p:stCondLst>
+                                    <p:cond delay="0"/>
+                                  </p:stCondLst>
+                                  <p:childTnLst>
+                                    <p:set>
+                                      <p:cBhvr>
+                                        <p:cTn id="6" dur="1" fill="hold">
+                                          <p:stCondLst>
+                                            <p:cond delay="0"/>
+                                          </p:stCondLst>
+                                        </p:cTn>
+                                        <p:tgtEl>
+                                          <p:spTgt spid="3">
+                                            <p:txEl>
+                                              <p:pRg st="0" end="0"/>
+                                            </p:txEl>
+                                          </p:spTgt>
+                                        </p:tgtEl>
+                                        <p:attrNameLst>
+                                          <p:attrName>style.visibility</p:attrName>
+                                        </p:attrNameLst>
+                                      </p:cBhvr>
+                                      <p:to>
+                                        <p:strVal val="visible"/>
+                                      </p:to>
+                                    </p:set>
+                                    <p:animEffect transition="in" filter="randombar(horizontal)">
+                                      <p:cBhvr>
+                                        <p:cTn id="7" dur="500"/>
+                                        <p:tgtEl>
+                                          <p:spTgt spid="3">
+                                            <p:txEl>
+                                              <p:pRg st="0" end="0"/>
+                                            </p:txEl>
+                                          </p:spTgt>
+                                        </p:tgtEl>
+                                      </p:cBhvr>
+                                    </p:animEffect>
+                                  </p:childTnLst>
+                                </p:cTn>
+                              </p:par>
+                            </p:childTnLst>
+                          </p:cTn>
+                        </p:par>
+                      </p:childTnLst>
+                    </p:cTn>
+                  </p:par>
+                  <p:par>
+                    <p:cTn id="8" fill="hold">
+                      <p:stCondLst>
+                        <p:cond delay="indefinite"/>
+                      </p:stCondLst>
+                      <p:childTnLst>
+                        <p:par>
+                          <p:cTn id="9" fill="hold">
+                            <p:stCondLst>
+                              <p:cond delay="0"/>
+                            </p:stCondLst>
+                            <p:childTnLst>
+                              <p:par>
+                                <p:cTn id="10" presetID="14" presetClass="entr" presetSubtype="10" fill="hold" grpId="0" nodeType="clickEffect">
+                                  <p:stCondLst>
+                                    <p:cond delay="0"/>
+                                  </p:stCondLst>
+                                  <p:childTnLst>
+                                    <p:set>
+                                      <p:cBhvr>
+                                        <p:cTn id="11" dur="1" fill="hold">
+                                          <p:stCondLst>
+                                            <p:cond delay="0"/>
+                                          </p:stCondLst>
+                                        </p:cTn>
+                                        <p:tgtEl>
+                                          <p:spTgt spid="3">
+                                            <p:txEl>
+                                              <p:pRg st="1" end="1"/>
+                                            </p:txEl>
+                                          </p:spTgt>
+                                        </p:tgtEl>
+                                        <p:attrNameLst>
+                                          <p:attrName>style.visibility</p:attrName>
+                                        </p:attrNameLst>
+                                      </p:cBhvr>
+                                      <p:to>
+                                        <p:strVal val="visible"/>
+                                      </p:to>
+                                    </p:set>
+                                    <p:animEffect transition="in" filter="randombar(horizontal)">
+                                      <p:cBhvr>
+                                        <p:cTn id="12" dur="500"/>
+                                        <p:tgtEl>
+                                          <p:spTgt spid="3">
+                                            <p:txEl>
+                                              <p:pRg st="1" end="1"/>
+                                            </p:txEl>
+                                          </p:spTgt>
+                                        </p:tgtEl>
+                                      </p:cBhvr>
+                                    </p:animEffect>
+                                  </p:childTnLst>
+                                </p:cTn>
+                              </p:par>
+                            </p:childTnLst>
+                          </p:cTn>
+                        </p:par>
+                      </p:childTnLst>
+                    </p:cTn>
+                  </p:par>
+                  <p:par>
+                    <p:cTn id="13" fill="hold">
+                      <p:stCondLst>
+                        <p:cond delay="indefinite"/>
+                      </p:stCondLst>
+                      <p:childTnLst>
+                        <p:par>
+                          <p:cTn id="14" fill="hold">
+                            <p:stCondLst>
+                              <p:cond delay="0"/>
+                            </p:stCondLst>
+                            <p:childTnLst>
+                              <p:par>
+                                <p:cTn id="15" presetID="14" presetClass="entr" presetSubtype="10" fill="hold" grpId="0" nodeType="clickEffect">
+                                  <p:stCondLst>
+                                    <p:cond delay="0"/>
+                                  </p:stCondLst>
+                                  <p:childTnLst>
+                                    <p:set>
+                                      <p:cBhvr>
+                                        <p:cTn id="16" dur="1" fill="hold">
+                                          <p:stCondLst>
+                                            <p:cond delay="0"/>
+                                          </p:stCondLst>
+                                        </p:cTn>
+                                        <p:tgtEl>
+                                          <p:spTgt spid="3">
+                                            <p:txEl>
+                                              <p:pRg st="2" end="2"/>
+                                            </p:txEl>
+                                          </p:spTgt>
+                                        </p:tgtEl>
+                                        <p:attrNameLst>
+                                          <p:attrName>style.visibility</p:attrName>
+                                        </p:attrNameLst>
+                                      </p:cBhvr>
+                                      <p:to>
+                                        <p:strVal val="visible"/>
+                                      </p:to>
+                                    </p:set>
+                                    <p:animEffect transition="in" filter="randombar(horizontal)">
+                                      <p:cBhvr>
+                                        <p:cTn id="17" dur="500"/>
+                                        <p:tgtEl>
+                                          <p:spTgt spid="3">
+                                            <p:txEl>
+                                              <p:pRg st="2" end="2"/>
+                                            </p:txEl>
+                                          </p:spTgt>
+                                        </p:tgtEl>
+                                      </p:cBhvr>
+                                    </p:animEffect>
+                                  </p:childTnLst>
+                                </p:cTn>
+                              </p:par>
+                            </p:childTnLst>
+                          </p:cTn>
+                        </p:par>
+                      </p:childTnLst>
+                    </p:cTn>
+                  </p:par>
+                  <p:par>
+                    <p:cTn id="18" fill="hold">
+                      <p:stCondLst>
+                        <p:cond delay="indefinite"/>
+                      </p:stCondLst>
+                      <p:childTnLst>
+                        <p:par>
+                          <p:cTn id="19" fill="hold">
+                            <p:stCondLst>
+                              <p:cond delay="0"/>
+                            </p:stCondLst>
+                            <p:childTnLst>
+                              <p:par>
+                                <p:cTn id="20" presetID="14" presetClass="entr" presetSubtype="10" fill="hold" grpId="0" nodeType="clickEffect">
+                                  <p:stCondLst>
+                                    <p:cond delay="0"/>
+                                  </p:stCondLst>
+                                  <p:childTnLst>
+                                    <p:set>
+                                      <p:cBhvr>
+                                        <p:cTn id="21" dur="1" fill="hold">
+                                          <p:stCondLst>
+                                            <p:cond delay="0"/>
+                                          </p:stCondLst>
+                                        </p:cTn>
+                                        <p:tgtEl>
+                                          <p:spTgt spid="3">
+                                            <p:txEl>
+                                              <p:pRg st="3" end="3"/>
+                                            </p:txEl>
+                                          </p:spTgt>
+                                        </p:tgtEl>
+                                        <p:attrNameLst>
+                                          <p:attrName>style.visibility</p:attrName>
+                                        </p:attrNameLst>
+                                      </p:cBhvr>
+                                      <p:to>
+                                        <p:strVal val="visible"/>
+                                      </p:to>
+                                    </p:set>
+                                    <p:animEffect transition="in" filter="randombar(horizontal)">
+                                      <p:cBhvr>
+                                        <p:cTn id="22" dur="500"/>
+                                        <p:tgtEl>
+                                          <p:spTgt spid="3">
+                                            <p:txEl>
+                                              <p:pRg st="3" end="3"/>
+                                            </p:txEl>
+                                          </p:spTgt>
+                                        </p:tgtEl>
+                                      </p:cBhvr>
+                                    </p:animEffect>
+                                  </p:childTnLst>
+                                </p:cTn>
+                              </p:par>
+                            </p:childTnLst>
+                          </p:cTn>
+                        </p:par>
+                      </p:childTnLst>
+                    </p:cTn>
+                  </p:par>
+                  <p:par>
+                    <p:cTn id="23" fill="hold">
+                      <p:stCondLst>
+                        <p:cond delay="indefinite"/>
+                      </p:stCondLst>
+                      <p:childTnLst>
+                        <p:par>
+                          <p:cTn id="24" fill="hold">
+                            <p:stCondLst>
+                              <p:cond delay="0"/>
+                            </p:stCondLst>
+                            <p:childTnLst>
+                              <p:par>
+                                <p:cTn id="25" presetID="14" presetClass="entr" presetSubtype="10" fill="hold" grpId="0" nodeType="clickEffect">
+                                  <p:stCondLst>
+                                    <p:cond delay="0"/>
+                                  </p:stCondLst>
+                                  <p:childTnLst>
+                                    <p:set>
+                                      <p:cBhvr>
+                                        <p:cTn id="26" dur="1" fill="hold">
+                                          <p:stCondLst>
+                                            <p:cond delay="0"/>
+                                          </p:stCondLst>
+                                        </p:cTn>
+                                        <p:tgtEl>
+                                          <p:spTgt spid="3">
+                                            <p:txEl>
+                                              <p:pRg st="4" end="4"/>
+                                            </p:txEl>
+                                          </p:spTgt>
+                                        </p:tgtEl>
+                                        <p:attrNameLst>
+                                          <p:attrName>style.visibility</p:attrName>
+                                        </p:attrNameLst>
+                                      </p:cBhvr>
+                                      <p:to>
+                                        <p:strVal val="visible"/>
+                                      </p:to>
+                                    </p:set>
+                                    <p:animEffect transition="in" filter="randombar(horizontal)">
+                                      <p:cBhvr>
+                                        <p:cTn id="27" dur="500"/>
+                                        <p:tgtEl>
+                                          <p:spTgt spid="3">
+                                            <p:txEl>
+                                              <p:pRg st="4" end="4"/>
+                                            </p:txEl>
+                                          </p:spTgt>
+                                        </p:tgtEl>
+                                      </p:cBhvr>
+                                    </p:animEffect>
+                                  </p:childTnLst>
+                                </p:cTn>
+                              </p:par>
+                            </p:childTnLst>
+                          </p:cTn>
+                        </p:par>
+                      </p:childTnLst>
+                    </p:cTn>
+                  </p:par>
+                  <p:par>
+                    <p:cTn id="28" fill="hold">
+                      <p:stCondLst>
+                        <p:cond delay="indefinite"/>
+                      </p:stCondLst>
+                      <p:childTnLst>
+                        <p:par>
+                          <p:cTn id="29" fill="hold">
+                            <p:stCondLst>
+                              <p:cond delay="0"/>
+                            </p:stCondLst>
+                            <p:childTnLst>
+                              <p:par>
+                                <p:cTn id="30" presetID="14" presetClass="entr" presetSubtype="10" fill="hold" grpId="0" nodeType="clickEffect">
+                                  <p:stCondLst>
+                                    <p:cond delay="0"/>
+                                  </p:stCondLst>
+                                  <p:childTnLst>
+                                    <p:set>
+                                      <p:cBhvr>
+                                        <p:cTn id="31" dur="1" fill="hold">
+                                          <p:stCondLst>
+                                            <p:cond delay="0"/>
+                                          </p:stCondLst>
+                                        </p:cTn>
+                                        <p:tgtEl>
+                                          <p:spTgt spid="3">
+                                            <p:txEl>
+                                              <p:pRg st="5" end="5"/>
+                                            </p:txEl>
+                                          </p:spTgt>
+                                        </p:tgtEl>
+                                        <p:attrNameLst>
+                                          <p:attrName>style.visibility</p:attrName>
+                                        </p:attrNameLst>
+                                      </p:cBhvr>
+                                      <p:to>
+                                        <p:strVal val="visible"/>
+                                      </p:to>
+                                    </p:set>
+                                    <p:animEffect transition="in" filter="randombar(horizontal)">
+                                      <p:cBhvr>
+                                        <p:cTn id="32" dur="500"/>
+                                        <p:tgtEl>
+                                          <p:spTgt spid="3">
+                                            <p:txEl>
+                                              <p:pRg st="5" end="5"/>
+                                            </p:txEl>
+                                          </p:spTgt>
+                                        </p:tgtEl>
+                                      </p:cBhvr>
+                                    </p:animEffect>
+                                  </p:childTnLst>
+                                </p:cTn>
+                              </p:par>
+                            </p:childTnLst>
+                          </p:cTn>
+                        </p:par>
+                      </p:childTnLst>
+                    </p:cTn>
+                  </p:par>
+                  <p:par>
+                    <p:cTn id="33" fill="hold">
+                      <p:stCondLst>
+                        <p:cond delay="indefinite"/>
+                      </p:stCondLst>
+                      <p:childTnLst>
+                        <p:par>
+                          <p:cTn id="34" fill="hold">
+                            <p:stCondLst>
+                              <p:cond delay="0"/>
+                            </p:stCondLst>
+                            <p:childTnLst>
+                              <p:par>
+                                <p:cTn id="35" presetID="14" presetClass="entr" presetSubtype="10" fill="hold" grpId="0" nodeType="clickEffect">
+                                  <p:stCondLst>
+                                    <p:cond delay="0"/>
+                                  </p:stCondLst>
+                                  <p:childTnLst>
+                                    <p:set>
+                                      <p:cBhvr>
+                                        <p:cTn id="36" dur="1" fill="hold">
+                                          <p:stCondLst>
+                                            <p:cond delay="0"/>
+                                          </p:stCondLst>
+                                        </p:cTn>
+                                        <p:tgtEl>
+                                          <p:spTgt spid="3">
+                                            <p:txEl>
+                                              <p:pRg st="6" end="6"/>
+                                            </p:txEl>
+                                          </p:spTgt>
+                                        </p:tgtEl>
+                                        <p:attrNameLst>
+                                          <p:attrName>style.visibility</p:attrName>
+                                        </p:attrNameLst>
+                                      </p:cBhvr>
+                                      <p:to>
+                                        <p:strVal val="visible"/>
+                                      </p:to>
+                                    </p:set>
+                                    <p:animEffect transition="in" filter="randombar(horizontal)">
+                                      <p:cBhvr>
+                                        <p:cTn id="37" dur="500"/>
+                                        <p:tgtEl>
+                                          <p:spTgt spid="3">
+                                            <p:txEl>
+                                              <p:pRg st="6" end="6"/>
+                                            </p:txEl>
+                                          </p:spTgt>
+                                        </p:tgtEl>
+                                      </p:cBhvr>
+                                    </p:animEffect>
+                                  </p:childTnLst>
+                                </p:cTn>
+                              </p:par>
+                            </p:childTnLst>
+                          </p:cTn>
+                        </p:par>
+                      </p:childTnLst>
+                    </p:cTn>
+                  </p:par>
+                </p:childTnLst>
+              </p:cTn>
+              <p:prevCondLst>
+                <p:cond evt="onPrev" delay="0">
+                  <p:tgtEl>
+                    <p:sldTgt/>
+                  </p:tgtEl>
+                </p:cond>
+              </p:prevCondLst>
+              <p:nextCondLst>
+                <p:cond evt="onNext" delay="0">
+                  <p:tgtEl>
+                    <p:sldTgt/>
+                  </p:tgtEl>
+                </p:cond>
+              </p:nextCondLst>
+            </p:seq>
+          </p:childTnLst>
+        </p:cTn>
       </p:par>
     </p:tnLst>
+    <p:bldLst>
+      <p:bldP spid="3" grpId="0" build="p"/>
+    </p:bldLst>
   </p:timing>
 </p:sld>
 </file>
@@ -10514,46 +11883,71 @@
           </a:xfrm>
         </p:spPr>
         <p:txBody>
-          <a:bodyPr/>
+          <a:bodyPr>
+            <a:noAutofit/>
+          </a:bodyPr>
           <a:lstStyle/>
           <a:p>
             <a:r>
-              <a:rPr lang="en-US" dirty="0" smtClean="0"/>
-              <a:t>Level: Easy – intermediate</a:t>
-            </a:r>
-          </a:p>
-          <a:p>
-            <a:endParaRPr lang="en-US" dirty="0" smtClean="0"/>
-          </a:p>
-          <a:p>
-            <a:r>
-              <a:rPr lang="en-US" dirty="0" smtClean="0"/>
+              <a:rPr lang="en-US" sz="2500" dirty="0" smtClean="0"/>
+              <a:t>Level: Easy – </a:t>
+            </a:r>
+            <a:r>
+              <a:rPr lang="en-US" sz="2500" dirty="0" smtClean="0"/>
+              <a:t>intermediate</a:t>
+            </a:r>
+            <a:endParaRPr lang="en-US" sz="2500" dirty="0" smtClean="0"/>
+          </a:p>
+          <a:p>
+            <a:r>
+              <a:rPr lang="en-US" sz="2500" dirty="0" smtClean="0"/>
               <a:t>How to:</a:t>
             </a:r>
           </a:p>
           <a:p>
             <a:pPr lvl="1"/>
             <a:r>
-              <a:rPr lang="en-US" dirty="0" smtClean="0"/>
-              <a:t>Entertain other people with the classical game “rock – paper – scissors” with a computer. User will choose 1 option (rock/paper/scissors) and computer will randomly throw out 1 option (rock/paper/scissors).  </a:t>
-            </a:r>
-            <a:r>
-              <a:rPr lang="en-US" dirty="0"/>
+              <a:rPr lang="en-US" sz="2500" dirty="0" smtClean="0"/>
+              <a:t>Entertain other people with the </a:t>
+            </a:r>
+            <a:r>
+              <a:rPr lang="en-US" sz="2500" dirty="0" smtClean="0"/>
+              <a:t>classic </a:t>
+            </a:r>
+            <a:r>
+              <a:rPr lang="en-US" sz="2500" dirty="0" smtClean="0"/>
+              <a:t>game “rock – paper – </a:t>
+            </a:r>
+            <a:r>
+              <a:rPr lang="en-US" sz="2500" dirty="0" smtClean="0"/>
+              <a:t>scissors” against the </a:t>
+            </a:r>
+            <a:r>
+              <a:rPr lang="en-US" sz="2500" dirty="0" smtClean="0"/>
+              <a:t>computer. User will choose 1 option (rock/paper/scissors) and computer will randomly throw out 1 option (rock/paper/scissors).  </a:t>
+            </a:r>
+            <a:r>
+              <a:rPr lang="en-US" sz="2500" dirty="0"/>
               <a:t>D</a:t>
             </a:r>
             <a:r>
-              <a:rPr lang="en-US" dirty="0" smtClean="0"/>
+              <a:rPr lang="en-US" sz="2500" dirty="0" smtClean="0"/>
               <a:t>eclare the winner.</a:t>
             </a:r>
           </a:p>
           <a:p>
-            <a:r>
-              <a:rPr lang="en-US" dirty="0" smtClean="0"/>
+            <a:pPr lvl="1"/>
+            <a:r>
+              <a:rPr lang="en-US" sz="2300" dirty="0" smtClean="0"/>
               <a:t>Ask user if they want to play again. If yes, play again; otherwise, exit program.</a:t>
             </a:r>
           </a:p>
           <a:p>
-            <a:endParaRPr lang="en-US" dirty="0" smtClean="0"/>
+            <a:r>
+              <a:rPr lang="en-US" sz="2500" dirty="0" smtClean="0"/>
+              <a:t>Too easy?</a:t>
+            </a:r>
+            <a:endParaRPr lang="en-US" sz="2500" dirty="0" smtClean="0"/>
           </a:p>
         </p:txBody>
       </p:sp>
@@ -10636,51 +12030,51 @@
         </p:nvSpPr>
         <p:spPr/>
         <p:txBody>
-          <a:bodyPr/>
+          <a:bodyPr>
+            <a:noAutofit/>
+          </a:bodyPr>
           <a:lstStyle/>
           <a:p>
             <a:r>
-              <a:rPr lang="en-US" dirty="0" smtClean="0"/>
+              <a:rPr lang="en-US" sz="2500" dirty="0" smtClean="0"/>
               <a:t>Level:  Hard </a:t>
             </a:r>
-          </a:p>
-          <a:p>
-            <a:endParaRPr lang="en-US" dirty="0"/>
-          </a:p>
-          <a:p>
-            <a:r>
-              <a:rPr lang="en-US" dirty="0" smtClean="0"/>
+            <a:endParaRPr lang="en-US" sz="2500" dirty="0"/>
+          </a:p>
+          <a:p>
+            <a:r>
+              <a:rPr lang="en-US" sz="2500" dirty="0" smtClean="0"/>
               <a:t>How to: </a:t>
             </a:r>
           </a:p>
           <a:p>
             <a:pPr lvl="1"/>
             <a:r>
-              <a:rPr lang="en-US" dirty="0" smtClean="0"/>
+              <a:rPr lang="en-US" sz="2500" dirty="0" smtClean="0"/>
               <a:t>Allow people to choose 15 numbers of their choice</a:t>
             </a:r>
           </a:p>
           <a:p>
             <a:pPr lvl="1"/>
             <a:r>
-              <a:rPr lang="en-US" dirty="0" smtClean="0"/>
+              <a:rPr lang="en-US" sz="2500" dirty="0" smtClean="0"/>
               <a:t>Create 20 numbers randomly, such that no number is repeated. </a:t>
             </a:r>
           </a:p>
           <a:p>
             <a:pPr lvl="1"/>
             <a:r>
-              <a:rPr lang="en-US" dirty="0" smtClean="0"/>
+              <a:rPr lang="en-US" sz="2500" dirty="0" smtClean="0"/>
               <a:t>Compare first and second step to see how many number are the same</a:t>
             </a:r>
           </a:p>
           <a:p>
             <a:pPr lvl="1"/>
             <a:r>
-              <a:rPr lang="en-US" dirty="0" smtClean="0"/>
+              <a:rPr lang="en-US" sz="2500" dirty="0" smtClean="0"/>
               <a:t>If there are more than 7 number, they win</a:t>
             </a:r>
-            <a:endParaRPr lang="en-US" dirty="0"/>
+            <a:endParaRPr lang="en-US" sz="2500" dirty="0"/>
           </a:p>
         </p:txBody>
       </p:sp>
@@ -13668,17 +15062,7 @@
                   </a:schemeClr>
                 </a:solidFill>
               </a:rPr>
-              <a:t>	</a:t>
-            </a:r>
-            <a:r>
-              <a:rPr lang="en-US" sz="3000" dirty="0">
-                <a:solidFill>
-                  <a:schemeClr val="accent1">
-                    <a:lumMod val="75000"/>
-                  </a:schemeClr>
-                </a:solidFill>
-              </a:rPr>
-              <a:t>expression = 1;</a:t>
+              <a:t>	expression = 1;</a:t>
             </a:r>
           </a:p>
           <a:p>
@@ -13702,17 +15086,7 @@
                   </a:schemeClr>
                 </a:solidFill>
               </a:rPr>
-              <a:t>	</a:t>
-            </a:r>
-            <a:r>
-              <a:rPr lang="en-US" sz="3000" dirty="0">
-                <a:solidFill>
-                  <a:schemeClr val="accent1">
-                    <a:lumMod val="75000"/>
-                  </a:schemeClr>
-                </a:solidFill>
-              </a:rPr>
-              <a:t>expression = 2;</a:t>
+              <a:t>	expression = 2;</a:t>
             </a:r>
           </a:p>
         </p:txBody>

</xml_diff>